<commit_message>
fleet + rent a car
</commit_message>
<xml_diff>
--- a/Archive/Controller Structure.pptx
+++ b/Archive/Controller Structure.pptx
@@ -387,7 +387,7 @@
           <a:p>
             <a:fld id="{78ABE3C1-DBE1-495D-B57B-2849774B866A}" type="datetimeFigureOut">
               <a:rPr lang="en-US" smtClean="0"/>
-              <a:t>6/24/2023</a:t>
+              <a:t>7/4/2023</a:t>
             </a:fld>
             <a:endParaRPr lang="en-US" dirty="0"/>
           </a:p>
@@ -801,7 +801,7 @@
           <a:p>
             <a:fld id="{446C117F-5CCF-4837-BE5F-2B92066CAFAF}" type="datetimeFigureOut">
               <a:rPr lang="en-US" smtClean="0"/>
-              <a:t>6/24/2023</a:t>
+              <a:t>7/4/2023</a:t>
             </a:fld>
             <a:endParaRPr lang="en-US" dirty="0"/>
           </a:p>
@@ -1137,7 +1137,7 @@
           <a:p>
             <a:fld id="{84EB90BD-B6CE-46B7-997F-7313B992CCDC}" type="datetimeFigureOut">
               <a:rPr lang="en-US" smtClean="0"/>
-              <a:t>6/24/2023</a:t>
+              <a:t>7/4/2023</a:t>
             </a:fld>
             <a:endParaRPr lang="en-US" dirty="0"/>
           </a:p>
@@ -1542,7 +1542,7 @@
           <a:p>
             <a:fld id="{CDB9D11F-B188-461D-B23F-39381795C052}" type="datetimeFigureOut">
               <a:rPr lang="en-US" smtClean="0"/>
-              <a:t>6/24/2023</a:t>
+              <a:t>7/4/2023</a:t>
             </a:fld>
             <a:endParaRPr lang="en-US" dirty="0"/>
           </a:p>
@@ -2110,7 +2110,7 @@
           <a:p>
             <a:fld id="{52E6D8D9-55A2-4063-B0F3-121F44549695}" type="datetimeFigureOut">
               <a:rPr lang="en-US" smtClean="0"/>
-              <a:t>6/24/2023</a:t>
+              <a:t>7/4/2023</a:t>
             </a:fld>
             <a:endParaRPr lang="en-US" dirty="0"/>
           </a:p>
@@ -2791,7 +2791,7 @@
           <a:p>
             <a:fld id="{D4B24536-994D-4021-A283-9F449C0DB509}" type="datetimeFigureOut">
               <a:rPr lang="en-US" smtClean="0"/>
-              <a:t>6/24/2023</a:t>
+              <a:t>7/4/2023</a:t>
             </a:fld>
             <a:endParaRPr lang="en-US" dirty="0"/>
           </a:p>
@@ -3704,7 +3704,7 @@
           <a:p>
             <a:fld id="{3CBBBB78-C96F-47B7-AB17-D852CA960AC9}" type="datetimeFigureOut">
               <a:rPr lang="en-US" smtClean="0"/>
-              <a:t>6/24/2023</a:t>
+              <a:t>7/4/2023</a:t>
             </a:fld>
             <a:endParaRPr lang="en-US" dirty="0"/>
           </a:p>
@@ -4017,7 +4017,7 @@
           <a:p>
             <a:fld id="{1FA3F48C-C7C6-4055-9F49-3777875E72AE}" type="datetimeFigureOut">
               <a:rPr lang="en-US" smtClean="0"/>
-              <a:t>6/24/2023</a:t>
+              <a:t>7/4/2023</a:t>
             </a:fld>
             <a:endParaRPr lang="en-US" dirty="0"/>
           </a:p>
@@ -4281,7 +4281,7 @@
           <a:p>
             <a:fld id="{6178E61D-D431-422C-9764-11DAFE33AB63}" type="datetimeFigureOut">
               <a:rPr lang="en-US" smtClean="0"/>
-              <a:t>6/24/2023</a:t>
+              <a:t>7/4/2023</a:t>
             </a:fld>
             <a:endParaRPr lang="en-US" dirty="0"/>
           </a:p>
@@ -4623,7 +4623,7 @@
           <a:p>
             <a:fld id="{12DE42F4-6EEF-4EF7-8ED4-2208F0F89A08}" type="datetimeFigureOut">
               <a:rPr lang="en-US" smtClean="0"/>
-              <a:t>6/24/2023</a:t>
+              <a:t>7/4/2023</a:t>
             </a:fld>
             <a:endParaRPr lang="en-US" dirty="0"/>
           </a:p>
@@ -5012,7 +5012,7 @@
           <a:p>
             <a:fld id="{30578ACC-22D6-47C1-A373-4FD133E34F3C}" type="datetimeFigureOut">
               <a:rPr lang="en-US" smtClean="0"/>
-              <a:t>6/24/2023</a:t>
+              <a:t>7/4/2023</a:t>
             </a:fld>
             <a:endParaRPr lang="en-US" dirty="0"/>
           </a:p>
@@ -5388,7 +5388,7 @@
           <a:p>
             <a:fld id="{4E5A6C69-6797-4E8A-BF37-F2C3751466E9}" type="datetimeFigureOut">
               <a:rPr lang="en-US" smtClean="0"/>
-              <a:t>6/24/2023</a:t>
+              <a:t>7/4/2023</a:t>
             </a:fld>
             <a:endParaRPr lang="en-US" dirty="0"/>
           </a:p>
@@ -5894,7 +5894,7 @@
           <a:p>
             <a:fld id="{D82014A1-A632-4878-A0D3-F52BA7563730}" type="datetimeFigureOut">
               <a:rPr lang="en-US" smtClean="0"/>
-              <a:t>6/24/2023</a:t>
+              <a:t>7/4/2023</a:t>
             </a:fld>
             <a:endParaRPr lang="en-US" dirty="0"/>
           </a:p>
@@ -6151,7 +6151,7 @@
           <a:p>
             <a:fld id="{CE99F462-093F-4566-844B-4C71F2739DA5}" type="datetimeFigureOut">
               <a:rPr lang="en-US" smtClean="0"/>
-              <a:t>6/24/2023</a:t>
+              <a:t>7/4/2023</a:t>
             </a:fld>
             <a:endParaRPr lang="en-US" dirty="0"/>
           </a:p>
@@ -6314,7 +6314,7 @@
           <a:p>
             <a:fld id="{3D24A7AC-904D-4781-85BA-7D10C17ED021}" type="datetimeFigureOut">
               <a:rPr lang="en-US" smtClean="0"/>
-              <a:t>6/24/2023</a:t>
+              <a:t>7/4/2023</a:t>
             </a:fld>
             <a:endParaRPr lang="en-US" dirty="0"/>
           </a:p>
@@ -6704,7 +6704,7 @@
           <a:p>
             <a:fld id="{E331444B-B92B-4E27-8C94-BB93EAF5CB18}" type="datetimeFigureOut">
               <a:rPr lang="en-US" smtClean="0"/>
-              <a:t>6/24/2023</a:t>
+              <a:t>7/4/2023</a:t>
             </a:fld>
             <a:endParaRPr lang="en-US" dirty="0"/>
           </a:p>
@@ -7113,7 +7113,7 @@
           <a:p>
             <a:fld id="{363EFA5E-FA76-400D-B3DC-F0BA90E6D107}" type="datetimeFigureOut">
               <a:rPr lang="en-US" smtClean="0"/>
-              <a:t>6/24/2023</a:t>
+              <a:t>7/4/2023</a:t>
             </a:fld>
             <a:endParaRPr lang="en-US" dirty="0"/>
           </a:p>
@@ -7357,7 +7357,7 @@
           <a:p>
             <a:fld id="{9D6E9DEC-419B-4CC5-A080-3B06BD5A8291}" type="datetimeFigureOut">
               <a:rPr lang="en-US" smtClean="0"/>
-              <a:t>6/24/2023</a:t>
+              <a:t>7/4/2023</a:t>
             </a:fld>
             <a:endParaRPr lang="en-US" dirty="0"/>
           </a:p>
@@ -7855,12 +7855,8 @@
           <a:lstStyle/>
           <a:p>
             <a:r>
-              <a:rPr lang="en-US" dirty="0" smtClean="0"/>
-              <a:t>Rental Car – ASP.NET MVC Project by Wajiha </a:t>
-            </a:r>
-            <a:r>
               <a:rPr lang="en-US" dirty="0"/>
-              <a:t>Muzaffar Ali</a:t>
+              <a:t>Rental Car – ASP.NET MVC Project by Wajiha Muzaffar Ali</a:t>
             </a:r>
           </a:p>
         </p:txBody>
@@ -8025,18 +8021,13 @@
               <a:buChar char="q"/>
             </a:pPr>
             <a:r>
-              <a:rPr lang="en-US" sz="2000" dirty="0" smtClean="0">
+              <a:rPr lang="en-US" sz="2000" dirty="0">
                 <a:solidFill>
                   <a:srgbClr val="FFFF00"/>
                 </a:solidFill>
               </a:rPr>
               <a:t>Index (Home Page)</a:t>
             </a:r>
-            <a:endParaRPr lang="en-US" sz="2000" dirty="0">
-              <a:solidFill>
-                <a:srgbClr val="FFFF00"/>
-              </a:solidFill>
-            </a:endParaRPr>
           </a:p>
           <a:p>
             <a:pPr marL="285750" indent="-285750">
@@ -8044,7 +8035,7 @@
               <a:buChar char="q"/>
             </a:pPr>
             <a:r>
-              <a:rPr lang="en-US" sz="2000" dirty="0" smtClean="0">
+              <a:rPr lang="en-US" sz="2000" dirty="0">
                 <a:solidFill>
                   <a:srgbClr val="FFFF00"/>
                 </a:solidFill>
@@ -8058,18 +8049,13 @@
               <a:buChar char="q"/>
             </a:pPr>
             <a:r>
-              <a:rPr lang="en-US" sz="2000" dirty="0" smtClean="0">
+              <a:rPr lang="en-US" sz="2000" dirty="0">
                 <a:solidFill>
                   <a:srgbClr val="FFFF00"/>
                 </a:solidFill>
               </a:rPr>
               <a:t>About</a:t>
             </a:r>
-            <a:endParaRPr lang="en-US" sz="2000" dirty="0">
-              <a:solidFill>
-                <a:srgbClr val="FFFF00"/>
-              </a:solidFill>
-            </a:endParaRPr>
           </a:p>
           <a:p>
             <a:pPr marL="285750" indent="-285750">
@@ -8105,7 +8091,7 @@
               <a:buChar char="q"/>
             </a:pPr>
             <a:r>
-              <a:rPr lang="en-US" sz="2000" dirty="0" smtClean="0">
+              <a:rPr lang="en-US" sz="2000" dirty="0">
                 <a:solidFill>
                   <a:srgbClr val="FFFF00"/>
                 </a:solidFill>
@@ -8119,7 +8105,7 @@
               <a:buChar char="q"/>
             </a:pPr>
             <a:r>
-              <a:rPr lang="en-US" sz="2000" dirty="0" smtClean="0">
+              <a:rPr lang="en-US" sz="2000" dirty="0">
                 <a:solidFill>
                   <a:srgbClr val="FFFF00"/>
                 </a:solidFill>
@@ -8165,7 +8151,11 @@
               <a:buChar char="q"/>
             </a:pPr>
             <a:r>
-              <a:rPr lang="en-US" sz="2000" dirty="0" smtClean="0"/>
+              <a:rPr lang="en-US" sz="2000" dirty="0">
+                <a:solidFill>
+                  <a:srgbClr val="FFFF00"/>
+                </a:solidFill>
+              </a:rPr>
               <a:t>Rent a Car</a:t>
             </a:r>
           </a:p>
@@ -8175,10 +8165,9 @@
               <a:buChar char="q"/>
             </a:pPr>
             <a:r>
-              <a:rPr lang="en-US" sz="2000" dirty="0" smtClean="0"/>
+              <a:rPr lang="en-US" sz="2000" dirty="0"/>
               <a:t>Past Rentals</a:t>
             </a:r>
-            <a:endParaRPr lang="en-US" sz="2000" dirty="0"/>
           </a:p>
           <a:p>
             <a:pPr marL="285750" indent="-285750">
@@ -8187,11 +8176,7 @@
             </a:pPr>
             <a:r>
               <a:rPr lang="en-US" sz="2000" dirty="0"/>
-              <a:t>Edit </a:t>
-            </a:r>
-            <a:r>
-              <a:rPr lang="en-US" sz="2000" dirty="0" smtClean="0"/>
-              <a:t>Profile</a:t>
+              <a:t>Edit Profile</a:t>
             </a:r>
           </a:p>
           <a:p>
@@ -8253,10 +8238,9 @@
               <a:buChar char="q"/>
             </a:pPr>
             <a:r>
-              <a:rPr lang="en-US" sz="2000" dirty="0" smtClean="0"/>
+              <a:rPr lang="en-US" sz="2000" dirty="0"/>
               <a:t>Index (Dashboard)</a:t>
             </a:r>
-            <a:endParaRPr lang="en-US" sz="2000" dirty="0"/>
           </a:p>
           <a:p>
             <a:pPr marL="342900" indent="-342900">
@@ -8264,7 +8248,7 @@
               <a:buChar char="q"/>
             </a:pPr>
             <a:r>
-              <a:rPr lang="en-US" sz="2000" dirty="0" smtClean="0">
+              <a:rPr lang="en-US" sz="2000" dirty="0">
                 <a:solidFill>
                   <a:srgbClr val="FFFF00"/>
                 </a:solidFill>
@@ -8278,10 +8262,9 @@
               <a:buChar char="q"/>
             </a:pPr>
             <a:r>
-              <a:rPr lang="en-US" sz="2000" dirty="0" smtClean="0"/>
+              <a:rPr lang="en-US" sz="2000" dirty="0"/>
               <a:t>Check Bookings</a:t>
             </a:r>
-            <a:endParaRPr lang="en-US" sz="2000" dirty="0"/>
           </a:p>
         </p:txBody>
       </p:sp>

</xml_diff>

<commit_message>
Rentals and Edit Profile
</commit_message>
<xml_diff>
--- a/Archive/Controller Structure.pptx
+++ b/Archive/Controller Structure.pptx
@@ -387,7 +387,7 @@
           <a:p>
             <a:fld id="{78ABE3C1-DBE1-495D-B57B-2849774B866A}" type="datetimeFigureOut">
               <a:rPr lang="en-US" smtClean="0"/>
-              <a:t>7/4/2023</a:t>
+              <a:t>7/6/2023</a:t>
             </a:fld>
             <a:endParaRPr lang="en-US" dirty="0"/>
           </a:p>
@@ -801,7 +801,7 @@
           <a:p>
             <a:fld id="{446C117F-5CCF-4837-BE5F-2B92066CAFAF}" type="datetimeFigureOut">
               <a:rPr lang="en-US" smtClean="0"/>
-              <a:t>7/4/2023</a:t>
+              <a:t>7/6/2023</a:t>
             </a:fld>
             <a:endParaRPr lang="en-US" dirty="0"/>
           </a:p>
@@ -1137,7 +1137,7 @@
           <a:p>
             <a:fld id="{84EB90BD-B6CE-46B7-997F-7313B992CCDC}" type="datetimeFigureOut">
               <a:rPr lang="en-US" smtClean="0"/>
-              <a:t>7/4/2023</a:t>
+              <a:t>7/6/2023</a:t>
             </a:fld>
             <a:endParaRPr lang="en-US" dirty="0"/>
           </a:p>
@@ -1542,7 +1542,7 @@
           <a:p>
             <a:fld id="{CDB9D11F-B188-461D-B23F-39381795C052}" type="datetimeFigureOut">
               <a:rPr lang="en-US" smtClean="0"/>
-              <a:t>7/4/2023</a:t>
+              <a:t>7/6/2023</a:t>
             </a:fld>
             <a:endParaRPr lang="en-US" dirty="0"/>
           </a:p>
@@ -2110,7 +2110,7 @@
           <a:p>
             <a:fld id="{52E6D8D9-55A2-4063-B0F3-121F44549695}" type="datetimeFigureOut">
               <a:rPr lang="en-US" smtClean="0"/>
-              <a:t>7/4/2023</a:t>
+              <a:t>7/6/2023</a:t>
             </a:fld>
             <a:endParaRPr lang="en-US" dirty="0"/>
           </a:p>
@@ -2791,7 +2791,7 @@
           <a:p>
             <a:fld id="{D4B24536-994D-4021-A283-9F449C0DB509}" type="datetimeFigureOut">
               <a:rPr lang="en-US" smtClean="0"/>
-              <a:t>7/4/2023</a:t>
+              <a:t>7/6/2023</a:t>
             </a:fld>
             <a:endParaRPr lang="en-US" dirty="0"/>
           </a:p>
@@ -3704,7 +3704,7 @@
           <a:p>
             <a:fld id="{3CBBBB78-C96F-47B7-AB17-D852CA960AC9}" type="datetimeFigureOut">
               <a:rPr lang="en-US" smtClean="0"/>
-              <a:t>7/4/2023</a:t>
+              <a:t>7/6/2023</a:t>
             </a:fld>
             <a:endParaRPr lang="en-US" dirty="0"/>
           </a:p>
@@ -4017,7 +4017,7 @@
           <a:p>
             <a:fld id="{1FA3F48C-C7C6-4055-9F49-3777875E72AE}" type="datetimeFigureOut">
               <a:rPr lang="en-US" smtClean="0"/>
-              <a:t>7/4/2023</a:t>
+              <a:t>7/6/2023</a:t>
             </a:fld>
             <a:endParaRPr lang="en-US" dirty="0"/>
           </a:p>
@@ -4281,7 +4281,7 @@
           <a:p>
             <a:fld id="{6178E61D-D431-422C-9764-11DAFE33AB63}" type="datetimeFigureOut">
               <a:rPr lang="en-US" smtClean="0"/>
-              <a:t>7/4/2023</a:t>
+              <a:t>7/6/2023</a:t>
             </a:fld>
             <a:endParaRPr lang="en-US" dirty="0"/>
           </a:p>
@@ -4623,7 +4623,7 @@
           <a:p>
             <a:fld id="{12DE42F4-6EEF-4EF7-8ED4-2208F0F89A08}" type="datetimeFigureOut">
               <a:rPr lang="en-US" smtClean="0"/>
-              <a:t>7/4/2023</a:t>
+              <a:t>7/6/2023</a:t>
             </a:fld>
             <a:endParaRPr lang="en-US" dirty="0"/>
           </a:p>
@@ -5012,7 +5012,7 @@
           <a:p>
             <a:fld id="{30578ACC-22D6-47C1-A373-4FD133E34F3C}" type="datetimeFigureOut">
               <a:rPr lang="en-US" smtClean="0"/>
-              <a:t>7/4/2023</a:t>
+              <a:t>7/6/2023</a:t>
             </a:fld>
             <a:endParaRPr lang="en-US" dirty="0"/>
           </a:p>
@@ -5388,7 +5388,7 @@
           <a:p>
             <a:fld id="{4E5A6C69-6797-4E8A-BF37-F2C3751466E9}" type="datetimeFigureOut">
               <a:rPr lang="en-US" smtClean="0"/>
-              <a:t>7/4/2023</a:t>
+              <a:t>7/6/2023</a:t>
             </a:fld>
             <a:endParaRPr lang="en-US" dirty="0"/>
           </a:p>
@@ -5894,7 +5894,7 @@
           <a:p>
             <a:fld id="{D82014A1-A632-4878-A0D3-F52BA7563730}" type="datetimeFigureOut">
               <a:rPr lang="en-US" smtClean="0"/>
-              <a:t>7/4/2023</a:t>
+              <a:t>7/6/2023</a:t>
             </a:fld>
             <a:endParaRPr lang="en-US" dirty="0"/>
           </a:p>
@@ -6151,7 +6151,7 @@
           <a:p>
             <a:fld id="{CE99F462-093F-4566-844B-4C71F2739DA5}" type="datetimeFigureOut">
               <a:rPr lang="en-US" smtClean="0"/>
-              <a:t>7/4/2023</a:t>
+              <a:t>7/6/2023</a:t>
             </a:fld>
             <a:endParaRPr lang="en-US" dirty="0"/>
           </a:p>
@@ -6314,7 +6314,7 @@
           <a:p>
             <a:fld id="{3D24A7AC-904D-4781-85BA-7D10C17ED021}" type="datetimeFigureOut">
               <a:rPr lang="en-US" smtClean="0"/>
-              <a:t>7/4/2023</a:t>
+              <a:t>7/6/2023</a:t>
             </a:fld>
             <a:endParaRPr lang="en-US" dirty="0"/>
           </a:p>
@@ -6704,7 +6704,7 @@
           <a:p>
             <a:fld id="{E331444B-B92B-4E27-8C94-BB93EAF5CB18}" type="datetimeFigureOut">
               <a:rPr lang="en-US" smtClean="0"/>
-              <a:t>7/4/2023</a:t>
+              <a:t>7/6/2023</a:t>
             </a:fld>
             <a:endParaRPr lang="en-US" dirty="0"/>
           </a:p>
@@ -7113,7 +7113,7 @@
           <a:p>
             <a:fld id="{363EFA5E-FA76-400D-B3DC-F0BA90E6D107}" type="datetimeFigureOut">
               <a:rPr lang="en-US" smtClean="0"/>
-              <a:t>7/4/2023</a:t>
+              <a:t>7/6/2023</a:t>
             </a:fld>
             <a:endParaRPr lang="en-US" dirty="0"/>
           </a:p>
@@ -7357,7 +7357,7 @@
           <a:p>
             <a:fld id="{9D6E9DEC-419B-4CC5-A080-3B06BD5A8291}" type="datetimeFigureOut">
               <a:rPr lang="en-US" smtClean="0"/>
-              <a:t>7/4/2023</a:t>
+              <a:t>7/6/2023</a:t>
             </a:fld>
             <a:endParaRPr lang="en-US" dirty="0"/>
           </a:p>
@@ -8165,7 +8165,11 @@
               <a:buChar char="q"/>
             </a:pPr>
             <a:r>
-              <a:rPr lang="en-US" sz="2000" dirty="0"/>
+              <a:rPr lang="en-US" sz="2000" dirty="0">
+                <a:solidFill>
+                  <a:srgbClr val="FFFF00"/>
+                </a:solidFill>
+              </a:rPr>
               <a:t>Past Rentals</a:t>
             </a:r>
           </a:p>
@@ -8175,7 +8179,11 @@
               <a:buChar char="q"/>
             </a:pPr>
             <a:r>
-              <a:rPr lang="en-US" sz="2000" dirty="0"/>
+              <a:rPr lang="en-US" sz="2000" dirty="0">
+                <a:solidFill>
+                  <a:srgbClr val="FFFF00"/>
+                </a:solidFill>
+              </a:rPr>
               <a:t>Edit Profile</a:t>
             </a:r>
           </a:p>

</xml_diff>